<commit_message>
update ch3 and 15
</commit_message>
<xml_diff>
--- a/jdocs/Macro2/Chapter 0_Roadmap.pptx
+++ b/jdocs/Macro2/Chapter 0_Roadmap.pptx
@@ -257,7 +257,7 @@
             <a:fld id="{3D064D1C-C877-48D9-8271-180C8DE21D00}" type="datetime4">
               <a:rPr lang="zh-CN" altLang="en-US"/>
               <a:pPr/>
-              <a:t>2014年1月27日星期一</a:t>
+              <a:t>2017年2月14日星期二</a:t>
             </a:fld>
             <a:endParaRPr lang="en-US" altLang="zh-CN"/>
           </a:p>
@@ -484,7 +484,7 @@
             <a:fld id="{58489A5C-8620-4F00-9526-7134053D99E2}" type="datetime4">
               <a:rPr lang="zh-CN" altLang="en-US"/>
               <a:pPr/>
-              <a:t>2014年1月27日星期一</a:t>
+              <a:t>2017年2月14日星期二</a:t>
             </a:fld>
             <a:endParaRPr lang="en-US" altLang="zh-CN"/>
           </a:p>
@@ -1002,7 +1002,7 @@
             <a:fld id="{26B9E577-8BF9-4D41-81ED-A1B8D3AB8426}" type="datetime1">
               <a:rPr lang="en-US" altLang="zh-CN" smtClean="0"/>
               <a:pPr/>
-              <a:t>1/27/2014</a:t>
+              <a:t>2/14/2017</a:t>
             </a:fld>
             <a:endParaRPr lang="en-US" altLang="zh-CN"/>
           </a:p>
@@ -1177,7 +1177,7 @@
             <a:fld id="{01BD82F0-5B71-435D-937C-050D8F621DD4}" type="datetime1">
               <a:rPr lang="en-US" altLang="zh-CN" smtClean="0"/>
               <a:pPr/>
-              <a:t>1/27/2014</a:t>
+              <a:t>2/14/2017</a:t>
             </a:fld>
             <a:endParaRPr lang="en-US" altLang="zh-CN"/>
           </a:p>
@@ -1362,7 +1362,7 @@
             <a:fld id="{0C1D6B7F-8544-4DAE-BF85-48143DA13BE7}" type="datetime1">
               <a:rPr lang="en-US" altLang="zh-CN" smtClean="0"/>
               <a:pPr/>
-              <a:t>1/27/2014</a:t>
+              <a:t>2/14/2017</a:t>
             </a:fld>
             <a:endParaRPr lang="en-US" altLang="zh-CN"/>
           </a:p>
@@ -1537,7 +1537,7 @@
             <a:fld id="{3E03678E-6F1D-45F3-B638-C4A5654FD474}" type="datetime1">
               <a:rPr lang="en-US" altLang="zh-CN" smtClean="0"/>
               <a:pPr/>
-              <a:t>1/27/2014</a:t>
+              <a:t>2/14/2017</a:t>
             </a:fld>
             <a:endParaRPr lang="en-US" altLang="zh-CN"/>
           </a:p>
@@ -1788,7 +1788,7 @@
             <a:fld id="{1D03C169-6974-4B3A-AC45-4FDBE774F09C}" type="datetime1">
               <a:rPr lang="en-US" altLang="zh-CN" smtClean="0"/>
               <a:pPr/>
-              <a:t>1/27/2014</a:t>
+              <a:t>2/14/2017</a:t>
             </a:fld>
             <a:endParaRPr lang="en-US" altLang="zh-CN"/>
           </a:p>
@@ -2081,7 +2081,7 @@
             <a:fld id="{2405320A-F880-4535-BFBA-6C2292428ED8}" type="datetime1">
               <a:rPr lang="en-US" altLang="zh-CN" smtClean="0"/>
               <a:pPr/>
-              <a:t>1/27/2014</a:t>
+              <a:t>2/14/2017</a:t>
             </a:fld>
             <a:endParaRPr lang="en-US" altLang="zh-CN"/>
           </a:p>
@@ -2508,7 +2508,7 @@
             <a:fld id="{A7E55DFE-0527-4755-BB6D-39880D4EEC3F}" type="datetime1">
               <a:rPr lang="en-US" altLang="zh-CN" smtClean="0"/>
               <a:pPr/>
-              <a:t>1/27/2014</a:t>
+              <a:t>2/14/2017</a:t>
             </a:fld>
             <a:endParaRPr lang="en-US" altLang="zh-CN"/>
           </a:p>
@@ -2631,7 +2631,7 @@
             <a:fld id="{9B3946B1-0E50-40D2-A4DA-904E7BB39E44}" type="datetime1">
               <a:rPr lang="en-US" altLang="zh-CN" smtClean="0"/>
               <a:pPr/>
-              <a:t>1/27/2014</a:t>
+              <a:t>2/14/2017</a:t>
             </a:fld>
             <a:endParaRPr lang="en-US" altLang="zh-CN"/>
           </a:p>
@@ -2731,7 +2731,7 @@
             <a:fld id="{FEFBF8FD-DE3B-410E-B024-2E8B6DE61792}" type="datetime1">
               <a:rPr lang="en-US" altLang="zh-CN" smtClean="0"/>
               <a:pPr/>
-              <a:t>1/27/2014</a:t>
+              <a:t>2/14/2017</a:t>
             </a:fld>
             <a:endParaRPr lang="en-US" altLang="zh-CN"/>
           </a:p>
@@ -3013,7 +3013,7 @@
             <a:fld id="{D69F1300-E96E-4C0E-9464-0DC5A7E10ABB}" type="datetime1">
               <a:rPr lang="en-US" altLang="zh-CN" smtClean="0"/>
               <a:pPr/>
-              <a:t>1/27/2014</a:t>
+              <a:t>2/14/2017</a:t>
             </a:fld>
             <a:endParaRPr lang="en-US" altLang="zh-CN"/>
           </a:p>
@@ -3271,7 +3271,7 @@
             <a:fld id="{A0A6798F-100E-4C50-80C4-EE1DCA05CB61}" type="datetime1">
               <a:rPr lang="en-US" altLang="zh-CN" smtClean="0"/>
               <a:pPr/>
-              <a:t>1/27/2014</a:t>
+              <a:t>2/14/2017</a:t>
             </a:fld>
             <a:endParaRPr lang="en-US" altLang="zh-CN"/>
           </a:p>
@@ -3489,7 +3489,7 @@
             <a:fld id="{F6A09E83-29D8-4200-A961-527387F30440}" type="datetime1">
               <a:rPr lang="en-US" altLang="zh-CN" smtClean="0"/>
               <a:pPr/>
-              <a:t>1/27/2014</a:t>
+              <a:t>2/14/2017</a:t>
             </a:fld>
             <a:endParaRPr lang="en-US" altLang="zh-CN"/>
           </a:p>
@@ -3917,15 +3917,7 @@
                   <a:schemeClr val="tx1"/>
                 </a:solidFill>
               </a:rPr>
-              <a:t>Econ </a:t>
-            </a:r>
-            <a:r>
-              <a:rPr lang="en-US" smtClean="0">
-                <a:solidFill>
-                  <a:schemeClr val="tx1"/>
-                </a:solidFill>
-              </a:rPr>
-              <a:t>310 </a:t>
+              <a:t>Econ 310 </a:t>
             </a:r>
             <a:r>
               <a:rPr lang="en-US" dirty="0" smtClean="0">
@@ -3961,7 +3953,7 @@
             <a:fld id="{3E03678E-6F1D-45F3-B638-C4A5654FD474}" type="datetime1">
               <a:rPr lang="en-US" altLang="zh-CN" smtClean="0"/>
               <a:pPr/>
-              <a:t>1/27/2014</a:t>
+              <a:t>2/14/2017</a:t>
             </a:fld>
             <a:endParaRPr lang="en-US" altLang="zh-CN"/>
           </a:p>
@@ -4051,7 +4043,7 @@
         </p:nvSpPr>
         <p:spPr>
           <a:xfrm>
-            <a:off x="76200" y="5194757"/>
+            <a:off x="76200" y="5430560"/>
             <a:ext cx="2667000" cy="1046440"/>
           </a:xfrm>
           <a:prstGeom prst="rect">
@@ -4120,7 +4112,7 @@
         </p:nvSpPr>
         <p:spPr>
           <a:xfrm>
-            <a:off x="85725" y="4040088"/>
+            <a:off x="85725" y="4363760"/>
             <a:ext cx="2667000" cy="1046440"/>
           </a:xfrm>
           <a:prstGeom prst="rect">
@@ -4197,8 +4189,8 @@
         </p:nvSpPr>
         <p:spPr>
           <a:xfrm>
-            <a:off x="76200" y="2134106"/>
-            <a:ext cx="2743200" cy="1785104"/>
+            <a:off x="76200" y="2087940"/>
+            <a:ext cx="2676525" cy="1354217"/>
           </a:xfrm>
           <a:prstGeom prst="rect">
             <a:avLst/>
@@ -4261,18 +4253,20 @@
               <a:buChar char="•"/>
             </a:pPr>
             <a:r>
+              <a:rPr lang="en-US" sz="1400" dirty="0" smtClean="0"/>
+              <a:t>Macro </a:t>
+            </a:r>
+            <a:r>
+              <a:rPr lang="en-US" sz="1400" dirty="0" err="1" smtClean="0"/>
+              <a:t>vars</a:t>
+            </a:r>
+            <a:r>
+              <a:rPr lang="en-US" sz="1400" dirty="0" smtClean="0"/>
+              <a:t> </a:t>
+            </a:r>
+            <a:r>
               <a:rPr lang="en-US" sz="1400" dirty="0"/>
-              <a:t>Three methods</a:t>
-            </a:r>
-          </a:p>
-          <a:p>
-            <a:pPr marL="342900" indent="-342900" algn="l">
-              <a:buFont typeface="Arial" pitchFamily="34" charset="0"/>
-              <a:buChar char="•"/>
-            </a:pPr>
-            <a:r>
-              <a:rPr lang="en-US" sz="1400" dirty="0"/>
-              <a:t>Macro variables and correlations</a:t>
+              <a:t>and correlations</a:t>
             </a:r>
           </a:p>
         </p:txBody>
@@ -4493,7 +4487,7 @@
         </p:nvSpPr>
         <p:spPr>
           <a:xfrm>
-            <a:off x="3136900" y="4495800"/>
+            <a:off x="3136900" y="4038600"/>
             <a:ext cx="2667000" cy="1292662"/>
           </a:xfrm>
           <a:prstGeom prst="rect">
@@ -4675,7 +4669,7 @@
         </p:nvSpPr>
         <p:spPr>
           <a:xfrm>
-            <a:off x="6096000" y="3200400"/>
+            <a:off x="6096000" y="2457271"/>
             <a:ext cx="2819400" cy="1200329"/>
           </a:xfrm>
           <a:prstGeom prst="rect">
@@ -4778,7 +4772,7 @@
         </p:nvSpPr>
         <p:spPr>
           <a:xfrm>
-            <a:off x="6096000" y="4495800"/>
+            <a:off x="6096000" y="3721894"/>
             <a:ext cx="2819400" cy="1231106"/>
           </a:xfrm>
           <a:prstGeom prst="rect">
@@ -4859,7 +4853,7 @@
         </p:nvSpPr>
         <p:spPr>
           <a:xfrm>
-            <a:off x="3124200" y="3026658"/>
+            <a:off x="3124200" y="2743200"/>
             <a:ext cx="2667000" cy="1261884"/>
           </a:xfrm>
           <a:prstGeom prst="rect">
@@ -4923,6 +4917,72 @@
               <a:rPr lang="en-US" sz="1400" dirty="0" smtClean="0"/>
               <a:t> equivalence</a:t>
             </a:r>
+          </a:p>
+        </p:txBody>
+      </p:sp>
+      <p:sp>
+        <p:nvSpPr>
+          <p:cNvPr id="19" name="TextBox 18"/>
+          <p:cNvSpPr txBox="1"/>
+          <p:nvPr/>
+        </p:nvSpPr>
+        <p:spPr>
+          <a:xfrm>
+            <a:off x="76200" y="3512403"/>
+            <a:ext cx="2667000" cy="830997"/>
+          </a:xfrm>
+          <a:prstGeom prst="rect">
+            <a:avLst/>
+          </a:prstGeom>
+        </p:spPr>
+        <p:style>
+          <a:lnRef idx="1">
+            <a:schemeClr val="accent1"/>
+          </a:lnRef>
+          <a:fillRef idx="2">
+            <a:schemeClr val="accent1"/>
+          </a:fillRef>
+          <a:effectRef idx="1">
+            <a:schemeClr val="accent1"/>
+          </a:effectRef>
+          <a:fontRef idx="minor">
+            <a:schemeClr val="dk1"/>
+          </a:fontRef>
+        </p:style>
+        <p:txBody>
+          <a:bodyPr wrap="square" rtlCol="0">
+            <a:spAutoFit/>
+          </a:bodyPr>
+          <a:lstStyle/>
+          <a:p>
+            <a:r>
+              <a:rPr lang="en-US" sz="2000" dirty="0" smtClean="0"/>
+              <a:t>Trade</a:t>
+            </a:r>
+            <a:endParaRPr lang="en-US" sz="2000" dirty="0" smtClean="0"/>
+          </a:p>
+          <a:p>
+            <a:pPr algn="l"/>
+            <a:r>
+              <a:rPr lang="en-US" sz="1400" dirty="0" smtClean="0"/>
+              <a:t>Chapter </a:t>
+            </a:r>
+            <a:r>
+              <a:rPr lang="en-US" sz="1400" dirty="0" smtClean="0"/>
+              <a:t>15</a:t>
+            </a:r>
+            <a:endParaRPr lang="en-US" sz="1400" dirty="0" smtClean="0"/>
+          </a:p>
+          <a:p>
+            <a:pPr marL="342900" indent="-342900" algn="l">
+              <a:buFont typeface="Arial" pitchFamily="34" charset="0"/>
+              <a:buChar char="•"/>
+            </a:pPr>
+            <a:r>
+              <a:rPr lang="en-US" sz="1400" dirty="0" smtClean="0"/>
+              <a:t>Trade Models</a:t>
+            </a:r>
+            <a:endParaRPr lang="en-US" sz="1400" dirty="0" smtClean="0"/>
           </a:p>
         </p:txBody>
       </p:sp>

</xml_diff>